<commit_message>
updated figure and activity
</commit_message>
<xml_diff>
--- a/figures/resources/output_saving.pptx
+++ b/figures/resources/output_saving.pptx
@@ -7,6 +7,7 @@
   <p:sldIdLst>
     <p:sldId id="256" r:id="rId2"/>
     <p:sldId id="257" r:id="rId3"/>
+    <p:sldId id="258" r:id="rId4"/>
   </p:sldIdLst>
   <p:sldSz cx="10972800" cy="4572000"/>
   <p:notesSz cx="6858000" cy="9144000"/>
@@ -244,7 +245,7 @@
           <a:p>
             <a:fld id="{F5BBD67F-9228-4D1B-A549-79D3048EE694}" type="datetimeFigureOut">
               <a:rPr lang="en-US" smtClean="0"/>
-              <a:t>3/18/2022</a:t>
+              <a:t>3/22/2022</a:t>
             </a:fld>
             <a:endParaRPr lang="en-US"/>
           </a:p>
@@ -414,7 +415,7 @@
           <a:p>
             <a:fld id="{F5BBD67F-9228-4D1B-A549-79D3048EE694}" type="datetimeFigureOut">
               <a:rPr lang="en-US" smtClean="0"/>
-              <a:t>3/18/2022</a:t>
+              <a:t>3/22/2022</a:t>
             </a:fld>
             <a:endParaRPr lang="en-US"/>
           </a:p>
@@ -594,7 +595,7 @@
           <a:p>
             <a:fld id="{F5BBD67F-9228-4D1B-A549-79D3048EE694}" type="datetimeFigureOut">
               <a:rPr lang="en-US" smtClean="0"/>
-              <a:t>3/18/2022</a:t>
+              <a:t>3/22/2022</a:t>
             </a:fld>
             <a:endParaRPr lang="en-US"/>
           </a:p>
@@ -764,7 +765,7 @@
           <a:p>
             <a:fld id="{F5BBD67F-9228-4D1B-A549-79D3048EE694}" type="datetimeFigureOut">
               <a:rPr lang="en-US" smtClean="0"/>
-              <a:t>3/18/2022</a:t>
+              <a:t>3/22/2022</a:t>
             </a:fld>
             <a:endParaRPr lang="en-US"/>
           </a:p>
@@ -1010,7 +1011,7 @@
           <a:p>
             <a:fld id="{F5BBD67F-9228-4D1B-A549-79D3048EE694}" type="datetimeFigureOut">
               <a:rPr lang="en-US" smtClean="0"/>
-              <a:t>3/18/2022</a:t>
+              <a:t>3/22/2022</a:t>
             </a:fld>
             <a:endParaRPr lang="en-US"/>
           </a:p>
@@ -1242,7 +1243,7 @@
           <a:p>
             <a:fld id="{F5BBD67F-9228-4D1B-A549-79D3048EE694}" type="datetimeFigureOut">
               <a:rPr lang="en-US" smtClean="0"/>
-              <a:t>3/18/2022</a:t>
+              <a:t>3/22/2022</a:t>
             </a:fld>
             <a:endParaRPr lang="en-US"/>
           </a:p>
@@ -1609,7 +1610,7 @@
           <a:p>
             <a:fld id="{F5BBD67F-9228-4D1B-A549-79D3048EE694}" type="datetimeFigureOut">
               <a:rPr lang="en-US" smtClean="0"/>
-              <a:t>3/18/2022</a:t>
+              <a:t>3/22/2022</a:t>
             </a:fld>
             <a:endParaRPr lang="en-US"/>
           </a:p>
@@ -1727,7 +1728,7 @@
           <a:p>
             <a:fld id="{F5BBD67F-9228-4D1B-A549-79D3048EE694}" type="datetimeFigureOut">
               <a:rPr lang="en-US" smtClean="0"/>
-              <a:t>3/18/2022</a:t>
+              <a:t>3/22/2022</a:t>
             </a:fld>
             <a:endParaRPr lang="en-US"/>
           </a:p>
@@ -1822,7 +1823,7 @@
           <a:p>
             <a:fld id="{F5BBD67F-9228-4D1B-A549-79D3048EE694}" type="datetimeFigureOut">
               <a:rPr lang="en-US" smtClean="0"/>
-              <a:t>3/18/2022</a:t>
+              <a:t>3/22/2022</a:t>
             </a:fld>
             <a:endParaRPr lang="en-US"/>
           </a:p>
@@ -2099,7 +2100,7 @@
           <a:p>
             <a:fld id="{F5BBD67F-9228-4D1B-A549-79D3048EE694}" type="datetimeFigureOut">
               <a:rPr lang="en-US" smtClean="0"/>
-              <a:t>3/18/2022</a:t>
+              <a:t>3/22/2022</a:t>
             </a:fld>
             <a:endParaRPr lang="en-US"/>
           </a:p>
@@ -2356,7 +2357,7 @@
           <a:p>
             <a:fld id="{F5BBD67F-9228-4D1B-A549-79D3048EE694}" type="datetimeFigureOut">
               <a:rPr lang="en-US" smtClean="0"/>
-              <a:t>3/18/2022</a:t>
+              <a:t>3/22/2022</a:t>
             </a:fld>
             <a:endParaRPr lang="en-US"/>
           </a:p>
@@ -2569,7 +2570,7 @@
           <a:p>
             <a:fld id="{F5BBD67F-9228-4D1B-A549-79D3048EE694}" type="datetimeFigureOut">
               <a:rPr lang="en-US" smtClean="0"/>
-              <a:t>3/18/2022</a:t>
+              <a:t>3/22/2022</a:t>
             </a:fld>
             <a:endParaRPr lang="en-US"/>
           </a:p>
@@ -8062,6 +8063,1268 @@
 </p:sld>
 </file>
 
+<file path=ppt/slides/slide3.xml><?xml version="1.0" encoding="utf-8"?>
+<p:sld xmlns:a="http://schemas.openxmlformats.org/drawingml/2006/main" xmlns:r="http://schemas.openxmlformats.org/officeDocument/2006/relationships" xmlns:p="http://schemas.openxmlformats.org/presentationml/2006/main">
+  <p:cSld>
+    <p:spTree>
+      <p:nvGrpSpPr>
+        <p:cNvPr id="1" name=""/>
+        <p:cNvGrpSpPr/>
+        <p:nvPr/>
+      </p:nvGrpSpPr>
+      <p:grpSpPr>
+        <a:xfrm>
+          <a:off x="0" y="0"/>
+          <a:ext cx="0" cy="0"/>
+          <a:chOff x="0" y="0"/>
+          <a:chExt cx="0" cy="0"/>
+        </a:xfrm>
+      </p:grpSpPr>
+      <p:pic>
+        <p:nvPicPr>
+          <p:cNvPr id="8" name="Picture 7"/>
+          <p:cNvPicPr>
+            <a:picLocks noChangeAspect="1"/>
+          </p:cNvPicPr>
+          <p:nvPr/>
+        </p:nvPicPr>
+        <p:blipFill rotWithShape="1">
+          <a:blip r:embed="rId2"/>
+          <a:srcRect l="1550" t="15184" r="1809" b="1566"/>
+          <a:stretch/>
+        </p:blipFill>
+        <p:spPr>
+          <a:xfrm>
+            <a:off x="538506" y="1808889"/>
+            <a:ext cx="1470364" cy="1464837"/>
+          </a:xfrm>
+          <a:prstGeom prst="rect">
+            <a:avLst/>
+          </a:prstGeom>
+          <a:ln>
+            <a:solidFill>
+              <a:schemeClr val="tx1"/>
+            </a:solidFill>
+          </a:ln>
+        </p:spPr>
+      </p:pic>
+      <p:sp>
+        <p:nvSpPr>
+          <p:cNvPr id="12" name="TextBox 11"/>
+          <p:cNvSpPr txBox="1"/>
+          <p:nvPr/>
+        </p:nvSpPr>
+        <p:spPr>
+          <a:xfrm>
+            <a:off x="221793" y="1279395"/>
+            <a:ext cx="1524457" cy="313932"/>
+          </a:xfrm>
+          <a:prstGeom prst="rect">
+            <a:avLst/>
+          </a:prstGeom>
+          <a:noFill/>
+        </p:spPr>
+        <p:txBody>
+          <a:bodyPr wrap="square" rtlCol="0">
+            <a:spAutoFit/>
+          </a:bodyPr>
+          <a:lstStyle/>
+          <a:p>
+            <a:r>
+              <a:rPr lang="nl-NL" sz="1440" dirty="0"/>
+              <a:t>a) Label mask</a:t>
+            </a:r>
+            <a:endParaRPr lang="en-US" sz="1440" dirty="0"/>
+          </a:p>
+        </p:txBody>
+      </p:sp>
+      <p:sp>
+        <p:nvSpPr>
+          <p:cNvPr id="13" name="TextBox 12"/>
+          <p:cNvSpPr txBox="1"/>
+          <p:nvPr/>
+        </p:nvSpPr>
+        <p:spPr>
+          <a:xfrm>
+            <a:off x="2270696" y="1279395"/>
+            <a:ext cx="2182468" cy="313932"/>
+          </a:xfrm>
+          <a:prstGeom prst="rect">
+            <a:avLst/>
+          </a:prstGeom>
+          <a:noFill/>
+        </p:spPr>
+        <p:txBody>
+          <a:bodyPr wrap="square" rtlCol="0">
+            <a:spAutoFit/>
+          </a:bodyPr>
+          <a:lstStyle/>
+          <a:p>
+            <a:pPr algn="ctr"/>
+            <a:r>
+              <a:rPr lang="nl-NL" sz="1440" dirty="0"/>
+              <a:t>b) Measurements table</a:t>
+            </a:r>
+            <a:endParaRPr lang="en-US" sz="1440" dirty="0"/>
+          </a:p>
+        </p:txBody>
+      </p:sp>
+      <p:sp>
+        <p:nvSpPr>
+          <p:cNvPr id="14" name="TextBox 13"/>
+          <p:cNvSpPr txBox="1"/>
+          <p:nvPr/>
+        </p:nvSpPr>
+        <p:spPr>
+          <a:xfrm>
+            <a:off x="5978498" y="1279395"/>
+            <a:ext cx="1597053" cy="313932"/>
+          </a:xfrm>
+          <a:prstGeom prst="rect">
+            <a:avLst/>
+          </a:prstGeom>
+          <a:noFill/>
+        </p:spPr>
+        <p:txBody>
+          <a:bodyPr wrap="square" rtlCol="0">
+            <a:spAutoFit/>
+          </a:bodyPr>
+          <a:lstStyle/>
+          <a:p>
+            <a:r>
+              <a:rPr lang="nl-NL" sz="1440" dirty="0"/>
+              <a:t>c) ROI set</a:t>
+            </a:r>
+            <a:endParaRPr lang="en-US" sz="1440" dirty="0"/>
+          </a:p>
+        </p:txBody>
+      </p:sp>
+      <p:graphicFrame>
+        <p:nvGraphicFramePr>
+          <p:cNvPr id="2" name="Table 1"/>
+          <p:cNvGraphicFramePr>
+            <a:graphicFrameLocks noGrp="1"/>
+          </p:cNvGraphicFramePr>
+          <p:nvPr>
+            <p:extLst>
+              <p:ext uri="{D42A27DB-BD31-4B8C-83A1-F6EECF244321}">
+                <p14:modId xmlns:p14="http://schemas.microsoft.com/office/powerpoint/2010/main" val="2417319534"/>
+              </p:ext>
+            </p:extLst>
+          </p:nvPr>
+        </p:nvGraphicFramePr>
+        <p:xfrm>
+          <a:off x="2904489" y="1891174"/>
+          <a:ext cx="2800690" cy="1240155"/>
+        </p:xfrm>
+        <a:graphic>
+          <a:graphicData uri="http://schemas.openxmlformats.org/drawingml/2006/table">
+            <a:tbl>
+              <a:tblPr>
+                <a:tableStyleId>{3B4B98B0-60AC-42C2-AFA5-B58CD77FA1E5}</a:tableStyleId>
+              </a:tblPr>
+              <a:tblGrid>
+                <a:gridCol w="560138">
+                  <a:extLst>
+                    <a:ext uri="{9D8B030D-6E8A-4147-A177-3AD203B41FA5}">
+                      <a16:colId xmlns:a16="http://schemas.microsoft.com/office/drawing/2014/main" val="3083052946"/>
+                    </a:ext>
+                  </a:extLst>
+                </a:gridCol>
+                <a:gridCol w="560138">
+                  <a:extLst>
+                    <a:ext uri="{9D8B030D-6E8A-4147-A177-3AD203B41FA5}">
+                      <a16:colId xmlns:a16="http://schemas.microsoft.com/office/drawing/2014/main" val="2739335031"/>
+                    </a:ext>
+                  </a:extLst>
+                </a:gridCol>
+                <a:gridCol w="560138">
+                  <a:extLst>
+                    <a:ext uri="{9D8B030D-6E8A-4147-A177-3AD203B41FA5}">
+                      <a16:colId xmlns:a16="http://schemas.microsoft.com/office/drawing/2014/main" val="3945957450"/>
+                    </a:ext>
+                  </a:extLst>
+                </a:gridCol>
+                <a:gridCol w="560138">
+                  <a:extLst>
+                    <a:ext uri="{9D8B030D-6E8A-4147-A177-3AD203B41FA5}">
+                      <a16:colId xmlns:a16="http://schemas.microsoft.com/office/drawing/2014/main" val="3313824974"/>
+                    </a:ext>
+                  </a:extLst>
+                </a:gridCol>
+                <a:gridCol w="560138">
+                  <a:extLst>
+                    <a:ext uri="{9D8B030D-6E8A-4147-A177-3AD203B41FA5}">
+                      <a16:colId xmlns:a16="http://schemas.microsoft.com/office/drawing/2014/main" val="2218882774"/>
+                    </a:ext>
+                  </a:extLst>
+                </a:gridCol>
+              </a:tblGrid>
+              <a:tr h="175044">
+                <a:tc>
+                  <a:txBody>
+                    <a:bodyPr/>
+                    <a:lstStyle/>
+                    <a:p>
+                      <a:pPr algn="l" fontAlgn="b"/>
+                      <a:r>
+                        <a:rPr lang="en-US" sz="1100" b="1" i="0" u="none" strike="noStrike">
+                          <a:solidFill>
+                            <a:srgbClr val="000000"/>
+                          </a:solidFill>
+                          <a:effectLst/>
+                          <a:latin typeface="Calibri" panose="020F0502020204030204" pitchFamily="34" charset="0"/>
+                        </a:rPr>
+                        <a:t>Label</a:t>
+                      </a:r>
+                    </a:p>
+                  </a:txBody>
+                  <a:tcPr marL="9525" marR="9525" marT="9525" marB="0" anchor="b">
+                    <a:lnT w="3175" cap="flat" cmpd="sng" algn="ctr">
+                      <a:solidFill>
+                        <a:schemeClr val="tx1"/>
+                      </a:solidFill>
+                      <a:prstDash val="solid"/>
+                      <a:round/>
+                      <a:headEnd type="none" w="med" len="med"/>
+                      <a:tailEnd type="none" w="med" len="med"/>
+                    </a:lnT>
+                    <a:lnB w="3175" cap="flat" cmpd="sng" algn="ctr">
+                      <a:solidFill>
+                        <a:schemeClr val="tx1"/>
+                      </a:solidFill>
+                      <a:prstDash val="solid"/>
+                      <a:round/>
+                      <a:headEnd type="none" w="med" len="med"/>
+                      <a:tailEnd type="none" w="med" len="med"/>
+                    </a:lnB>
+                  </a:tcPr>
+                </a:tc>
+                <a:tc>
+                  <a:txBody>
+                    <a:bodyPr/>
+                    <a:lstStyle/>
+                    <a:p>
+                      <a:pPr algn="l" fontAlgn="b"/>
+                      <a:r>
+                        <a:rPr lang="en-US" sz="1100" b="1" i="0" u="none" strike="noStrike">
+                          <a:solidFill>
+                            <a:srgbClr val="000000"/>
+                          </a:solidFill>
+                          <a:effectLst/>
+                          <a:latin typeface="Calibri" panose="020F0502020204030204" pitchFamily="34" charset="0"/>
+                        </a:rPr>
+                        <a:t>Area</a:t>
+                      </a:r>
+                    </a:p>
+                  </a:txBody>
+                  <a:tcPr marL="9525" marR="9525" marT="9525" marB="0" anchor="b">
+                    <a:lnT w="3175" cap="flat" cmpd="sng" algn="ctr">
+                      <a:solidFill>
+                        <a:schemeClr val="tx1"/>
+                      </a:solidFill>
+                      <a:prstDash val="solid"/>
+                      <a:round/>
+                      <a:headEnd type="none" w="med" len="med"/>
+                      <a:tailEnd type="none" w="med" len="med"/>
+                    </a:lnT>
+                    <a:lnB w="3175" cap="flat" cmpd="sng" algn="ctr">
+                      <a:solidFill>
+                        <a:schemeClr val="tx1"/>
+                      </a:solidFill>
+                      <a:prstDash val="solid"/>
+                      <a:round/>
+                      <a:headEnd type="none" w="med" len="med"/>
+                      <a:tailEnd type="none" w="med" len="med"/>
+                    </a:lnB>
+                  </a:tcPr>
+                </a:tc>
+                <a:tc>
+                  <a:txBody>
+                    <a:bodyPr/>
+                    <a:lstStyle/>
+                    <a:p>
+                      <a:pPr algn="l" fontAlgn="b"/>
+                      <a:r>
+                        <a:rPr lang="en-US" sz="1100" b="1" i="0" u="none" strike="noStrike">
+                          <a:solidFill>
+                            <a:srgbClr val="000000"/>
+                          </a:solidFill>
+                          <a:effectLst/>
+                          <a:latin typeface="Calibri" panose="020F0502020204030204" pitchFamily="34" charset="0"/>
+                        </a:rPr>
+                        <a:t>Perim.</a:t>
+                      </a:r>
+                    </a:p>
+                  </a:txBody>
+                  <a:tcPr marL="9525" marR="9525" marT="9525" marB="0" anchor="b">
+                    <a:lnT w="3175" cap="flat" cmpd="sng" algn="ctr">
+                      <a:solidFill>
+                        <a:schemeClr val="tx1"/>
+                      </a:solidFill>
+                      <a:prstDash val="solid"/>
+                      <a:round/>
+                      <a:headEnd type="none" w="med" len="med"/>
+                      <a:tailEnd type="none" w="med" len="med"/>
+                    </a:lnT>
+                    <a:lnB w="3175" cap="flat" cmpd="sng" algn="ctr">
+                      <a:solidFill>
+                        <a:schemeClr val="tx1"/>
+                      </a:solidFill>
+                      <a:prstDash val="solid"/>
+                      <a:round/>
+                      <a:headEnd type="none" w="med" len="med"/>
+                      <a:tailEnd type="none" w="med" len="med"/>
+                    </a:lnB>
+                  </a:tcPr>
+                </a:tc>
+                <a:tc>
+                  <a:txBody>
+                    <a:bodyPr/>
+                    <a:lstStyle/>
+                    <a:p>
+                      <a:pPr algn="l" fontAlgn="b"/>
+                      <a:r>
+                        <a:rPr lang="en-US" sz="1100" b="1" i="0" u="none" strike="noStrike">
+                          <a:solidFill>
+                            <a:srgbClr val="000000"/>
+                          </a:solidFill>
+                          <a:effectLst/>
+                          <a:latin typeface="Calibri" panose="020F0502020204030204" pitchFamily="34" charset="0"/>
+                        </a:rPr>
+                        <a:t>X</a:t>
+                      </a:r>
+                    </a:p>
+                  </a:txBody>
+                  <a:tcPr marL="9525" marR="9525" marT="9525" marB="0" anchor="b">
+                    <a:lnT w="3175" cap="flat" cmpd="sng" algn="ctr">
+                      <a:solidFill>
+                        <a:schemeClr val="tx1"/>
+                      </a:solidFill>
+                      <a:prstDash val="solid"/>
+                      <a:round/>
+                      <a:headEnd type="none" w="med" len="med"/>
+                      <a:tailEnd type="none" w="med" len="med"/>
+                    </a:lnT>
+                    <a:lnB w="3175" cap="flat" cmpd="sng" algn="ctr">
+                      <a:solidFill>
+                        <a:schemeClr val="tx1"/>
+                      </a:solidFill>
+                      <a:prstDash val="solid"/>
+                      <a:round/>
+                      <a:headEnd type="none" w="med" len="med"/>
+                      <a:tailEnd type="none" w="med" len="med"/>
+                    </a:lnB>
+                  </a:tcPr>
+                </a:tc>
+                <a:tc>
+                  <a:txBody>
+                    <a:bodyPr/>
+                    <a:lstStyle/>
+                    <a:p>
+                      <a:pPr algn="l" fontAlgn="b"/>
+                      <a:r>
+                        <a:rPr lang="en-US" sz="1100" b="1" i="0" u="none" strike="noStrike">
+                          <a:solidFill>
+                            <a:srgbClr val="000000"/>
+                          </a:solidFill>
+                          <a:effectLst/>
+                          <a:latin typeface="Calibri" panose="020F0502020204030204" pitchFamily="34" charset="0"/>
+                        </a:rPr>
+                        <a:t>Y</a:t>
+                      </a:r>
+                    </a:p>
+                  </a:txBody>
+                  <a:tcPr marL="9525" marR="9525" marT="9525" marB="0" anchor="b">
+                    <a:lnT w="3175" cap="flat" cmpd="sng" algn="ctr">
+                      <a:solidFill>
+                        <a:schemeClr val="tx1"/>
+                      </a:solidFill>
+                      <a:prstDash val="solid"/>
+                      <a:round/>
+                      <a:headEnd type="none" w="med" len="med"/>
+                      <a:tailEnd type="none" w="med" len="med"/>
+                    </a:lnT>
+                    <a:lnB w="3175" cap="flat" cmpd="sng" algn="ctr">
+                      <a:solidFill>
+                        <a:schemeClr val="tx1"/>
+                      </a:solidFill>
+                      <a:prstDash val="solid"/>
+                      <a:round/>
+                      <a:headEnd type="none" w="med" len="med"/>
+                      <a:tailEnd type="none" w="med" len="med"/>
+                    </a:lnB>
+                  </a:tcPr>
+                </a:tc>
+                <a:extLst>
+                  <a:ext uri="{0D108BD9-81ED-4DB2-BD59-A6C34878D82A}">
+                    <a16:rowId xmlns:a16="http://schemas.microsoft.com/office/drawing/2014/main" val="2704985016"/>
+                  </a:ext>
+                </a:extLst>
+              </a:tr>
+              <a:tr h="175044">
+                <a:tc>
+                  <a:txBody>
+                    <a:bodyPr/>
+                    <a:lstStyle/>
+                    <a:p>
+                      <a:pPr algn="r" fontAlgn="b"/>
+                      <a:r>
+                        <a:rPr lang="en-US" sz="1100" b="0" i="0" u="none" strike="noStrike">
+                          <a:solidFill>
+                            <a:srgbClr val="000000"/>
+                          </a:solidFill>
+                          <a:effectLst/>
+                          <a:latin typeface="Calibri" panose="020F0502020204030204" pitchFamily="34" charset="0"/>
+                        </a:rPr>
+                        <a:t>1</a:t>
+                      </a:r>
+                    </a:p>
+                  </a:txBody>
+                  <a:tcPr marL="9525" marR="9525" marT="9525" marB="0" anchor="b">
+                    <a:lnT w="3175" cap="flat" cmpd="sng" algn="ctr">
+                      <a:solidFill>
+                        <a:schemeClr val="tx1"/>
+                      </a:solidFill>
+                      <a:prstDash val="solid"/>
+                      <a:round/>
+                      <a:headEnd type="none" w="med" len="med"/>
+                      <a:tailEnd type="none" w="med" len="med"/>
+                    </a:lnT>
+                  </a:tcPr>
+                </a:tc>
+                <a:tc>
+                  <a:txBody>
+                    <a:bodyPr/>
+                    <a:lstStyle/>
+                    <a:p>
+                      <a:pPr algn="r" fontAlgn="b"/>
+                      <a:r>
+                        <a:rPr lang="en-US" sz="1100" b="0" i="0" u="none" strike="noStrike">
+                          <a:solidFill>
+                            <a:srgbClr val="000000"/>
+                          </a:solidFill>
+                          <a:effectLst/>
+                          <a:latin typeface="Calibri" panose="020F0502020204030204" pitchFamily="34" charset="0"/>
+                        </a:rPr>
+                        <a:t>865</a:t>
+                      </a:r>
+                    </a:p>
+                  </a:txBody>
+                  <a:tcPr marL="9525" marR="9525" marT="9525" marB="0" anchor="b">
+                    <a:lnT w="3175" cap="flat" cmpd="sng" algn="ctr">
+                      <a:solidFill>
+                        <a:schemeClr val="tx1"/>
+                      </a:solidFill>
+                      <a:prstDash val="solid"/>
+                      <a:round/>
+                      <a:headEnd type="none" w="med" len="med"/>
+                      <a:tailEnd type="none" w="med" len="med"/>
+                    </a:lnT>
+                  </a:tcPr>
+                </a:tc>
+                <a:tc>
+                  <a:txBody>
+                    <a:bodyPr/>
+                    <a:lstStyle/>
+                    <a:p>
+                      <a:pPr algn="r" fontAlgn="b"/>
+                      <a:r>
+                        <a:rPr lang="en-US" sz="1100" b="0" i="0" u="none" strike="noStrike">
+                          <a:solidFill>
+                            <a:srgbClr val="000000"/>
+                          </a:solidFill>
+                          <a:effectLst/>
+                          <a:latin typeface="Calibri" panose="020F0502020204030204" pitchFamily="34" charset="0"/>
+                        </a:rPr>
+                        <a:t>118.326</a:t>
+                      </a:r>
+                    </a:p>
+                  </a:txBody>
+                  <a:tcPr marL="9525" marR="9525" marT="9525" marB="0" anchor="b">
+                    <a:lnT w="3175" cap="flat" cmpd="sng" algn="ctr">
+                      <a:solidFill>
+                        <a:schemeClr val="tx1"/>
+                      </a:solidFill>
+                      <a:prstDash val="solid"/>
+                      <a:round/>
+                      <a:headEnd type="none" w="med" len="med"/>
+                      <a:tailEnd type="none" w="med" len="med"/>
+                    </a:lnT>
+                  </a:tcPr>
+                </a:tc>
+                <a:tc>
+                  <a:txBody>
+                    <a:bodyPr/>
+                    <a:lstStyle/>
+                    <a:p>
+                      <a:pPr algn="r" fontAlgn="b"/>
+                      <a:r>
+                        <a:rPr lang="en-US" sz="1100" b="0" i="0" u="none" strike="noStrike">
+                          <a:solidFill>
+                            <a:srgbClr val="000000"/>
+                          </a:solidFill>
+                          <a:effectLst/>
+                          <a:latin typeface="Calibri" panose="020F0502020204030204" pitchFamily="34" charset="0"/>
+                        </a:rPr>
+                        <a:t>128.923</a:t>
+                      </a:r>
+                    </a:p>
+                  </a:txBody>
+                  <a:tcPr marL="9525" marR="9525" marT="9525" marB="0" anchor="b">
+                    <a:lnT w="3175" cap="flat" cmpd="sng" algn="ctr">
+                      <a:solidFill>
+                        <a:schemeClr val="tx1"/>
+                      </a:solidFill>
+                      <a:prstDash val="solid"/>
+                      <a:round/>
+                      <a:headEnd type="none" w="med" len="med"/>
+                      <a:tailEnd type="none" w="med" len="med"/>
+                    </a:lnT>
+                  </a:tcPr>
+                </a:tc>
+                <a:tc>
+                  <a:txBody>
+                    <a:bodyPr/>
+                    <a:lstStyle/>
+                    <a:p>
+                      <a:pPr algn="r" fontAlgn="b"/>
+                      <a:r>
+                        <a:rPr lang="en-US" sz="1100" b="0" i="0" u="none" strike="noStrike">
+                          <a:solidFill>
+                            <a:srgbClr val="000000"/>
+                          </a:solidFill>
+                          <a:effectLst/>
+                          <a:latin typeface="Calibri" panose="020F0502020204030204" pitchFamily="34" charset="0"/>
+                        </a:rPr>
+                        <a:t>44.272</a:t>
+                      </a:r>
+                    </a:p>
+                  </a:txBody>
+                  <a:tcPr marL="9525" marR="9525" marT="9525" marB="0" anchor="b">
+                    <a:lnT w="3175" cap="flat" cmpd="sng" algn="ctr">
+                      <a:solidFill>
+                        <a:schemeClr val="tx1"/>
+                      </a:solidFill>
+                      <a:prstDash val="solid"/>
+                      <a:round/>
+                      <a:headEnd type="none" w="med" len="med"/>
+                      <a:tailEnd type="none" w="med" len="med"/>
+                    </a:lnT>
+                  </a:tcPr>
+                </a:tc>
+                <a:extLst>
+                  <a:ext uri="{0D108BD9-81ED-4DB2-BD59-A6C34878D82A}">
+                    <a16:rowId xmlns:a16="http://schemas.microsoft.com/office/drawing/2014/main" val="2738829116"/>
+                  </a:ext>
+                </a:extLst>
+              </a:tr>
+              <a:tr h="175044">
+                <a:tc>
+                  <a:txBody>
+                    <a:bodyPr/>
+                    <a:lstStyle/>
+                    <a:p>
+                      <a:pPr algn="r" fontAlgn="b"/>
+                      <a:r>
+                        <a:rPr lang="en-US" sz="1100" b="0" i="0" u="none" strike="noStrike">
+                          <a:solidFill>
+                            <a:srgbClr val="000000"/>
+                          </a:solidFill>
+                          <a:effectLst/>
+                          <a:latin typeface="Calibri" panose="020F0502020204030204" pitchFamily="34" charset="0"/>
+                        </a:rPr>
+                        <a:t>2</a:t>
+                      </a:r>
+                    </a:p>
+                  </a:txBody>
+                  <a:tcPr marL="9525" marR="9525" marT="9525" marB="0" anchor="b"/>
+                </a:tc>
+                <a:tc>
+                  <a:txBody>
+                    <a:bodyPr/>
+                    <a:lstStyle/>
+                    <a:p>
+                      <a:pPr algn="r" fontAlgn="b"/>
+                      <a:r>
+                        <a:rPr lang="en-US" sz="1100" b="0" i="0" u="none" strike="noStrike">
+                          <a:solidFill>
+                            <a:srgbClr val="000000"/>
+                          </a:solidFill>
+                          <a:effectLst/>
+                          <a:latin typeface="Calibri" panose="020F0502020204030204" pitchFamily="34" charset="0"/>
+                        </a:rPr>
+                        <a:t>793</a:t>
+                      </a:r>
+                    </a:p>
+                  </a:txBody>
+                  <a:tcPr marL="9525" marR="9525" marT="9525" marB="0" anchor="b"/>
+                </a:tc>
+                <a:tc>
+                  <a:txBody>
+                    <a:bodyPr/>
+                    <a:lstStyle/>
+                    <a:p>
+                      <a:pPr algn="r" fontAlgn="b"/>
+                      <a:r>
+                        <a:rPr lang="en-US" sz="1100" b="0" i="0" u="none" strike="noStrike">
+                          <a:solidFill>
+                            <a:srgbClr val="000000"/>
+                          </a:solidFill>
+                          <a:effectLst/>
+                          <a:latin typeface="Calibri" panose="020F0502020204030204" pitchFamily="34" charset="0"/>
+                        </a:rPr>
+                        <a:t>116.811</a:t>
+                      </a:r>
+                    </a:p>
+                  </a:txBody>
+                  <a:tcPr marL="9525" marR="9525" marT="9525" marB="0" anchor="b"/>
+                </a:tc>
+                <a:tc>
+                  <a:txBody>
+                    <a:bodyPr/>
+                    <a:lstStyle/>
+                    <a:p>
+                      <a:pPr algn="r" fontAlgn="b"/>
+                      <a:r>
+                        <a:rPr lang="en-US" sz="1100" b="0" i="0" u="none" strike="noStrike">
+                          <a:solidFill>
+                            <a:srgbClr val="000000"/>
+                          </a:solidFill>
+                          <a:effectLst/>
+                          <a:latin typeface="Calibri" panose="020F0502020204030204" pitchFamily="34" charset="0"/>
+                        </a:rPr>
+                        <a:t>53.4</a:t>
+                      </a:r>
+                    </a:p>
+                  </a:txBody>
+                  <a:tcPr marL="9525" marR="9525" marT="9525" marB="0" anchor="b"/>
+                </a:tc>
+                <a:tc>
+                  <a:txBody>
+                    <a:bodyPr/>
+                    <a:lstStyle/>
+                    <a:p>
+                      <a:pPr algn="r" fontAlgn="b"/>
+                      <a:r>
+                        <a:rPr lang="en-US" sz="1100" b="0" i="0" u="none" strike="noStrike">
+                          <a:solidFill>
+                            <a:srgbClr val="000000"/>
+                          </a:solidFill>
+                          <a:effectLst/>
+                          <a:latin typeface="Calibri" panose="020F0502020204030204" pitchFamily="34" charset="0"/>
+                        </a:rPr>
+                        <a:t>42.165</a:t>
+                      </a:r>
+                    </a:p>
+                  </a:txBody>
+                  <a:tcPr marL="9525" marR="9525" marT="9525" marB="0" anchor="b"/>
+                </a:tc>
+                <a:extLst>
+                  <a:ext uri="{0D108BD9-81ED-4DB2-BD59-A6C34878D82A}">
+                    <a16:rowId xmlns:a16="http://schemas.microsoft.com/office/drawing/2014/main" val="298208192"/>
+                  </a:ext>
+                </a:extLst>
+              </a:tr>
+              <a:tr h="175044">
+                <a:tc>
+                  <a:txBody>
+                    <a:bodyPr/>
+                    <a:lstStyle/>
+                    <a:p>
+                      <a:pPr algn="r" fontAlgn="b"/>
+                      <a:r>
+                        <a:rPr lang="en-US" sz="1100" b="0" i="0" u="none" strike="noStrike">
+                          <a:solidFill>
+                            <a:srgbClr val="000000"/>
+                          </a:solidFill>
+                          <a:effectLst/>
+                          <a:latin typeface="Calibri" panose="020F0502020204030204" pitchFamily="34" charset="0"/>
+                        </a:rPr>
+                        <a:t>3</a:t>
+                      </a:r>
+                    </a:p>
+                  </a:txBody>
+                  <a:tcPr marL="9525" marR="9525" marT="9525" marB="0" anchor="b"/>
+                </a:tc>
+                <a:tc>
+                  <a:txBody>
+                    <a:bodyPr/>
+                    <a:lstStyle/>
+                    <a:p>
+                      <a:pPr algn="r" fontAlgn="b"/>
+                      <a:r>
+                        <a:rPr lang="en-US" sz="1100" b="0" i="0" u="none" strike="noStrike">
+                          <a:solidFill>
+                            <a:srgbClr val="000000"/>
+                          </a:solidFill>
+                          <a:effectLst/>
+                          <a:latin typeface="Calibri" panose="020F0502020204030204" pitchFamily="34" charset="0"/>
+                        </a:rPr>
+                        <a:t>737</a:t>
+                      </a:r>
+                    </a:p>
+                  </a:txBody>
+                  <a:tcPr marL="9525" marR="9525" marT="9525" marB="0" anchor="b"/>
+                </a:tc>
+                <a:tc>
+                  <a:txBody>
+                    <a:bodyPr/>
+                    <a:lstStyle/>
+                    <a:p>
+                      <a:pPr algn="r" fontAlgn="b"/>
+                      <a:r>
+                        <a:rPr lang="en-US" sz="1100" b="0" i="0" u="none" strike="noStrike">
+                          <a:solidFill>
+                            <a:srgbClr val="000000"/>
+                          </a:solidFill>
+                          <a:effectLst/>
+                          <a:latin typeface="Calibri" panose="020F0502020204030204" pitchFamily="34" charset="0"/>
+                        </a:rPr>
+                        <a:t>102.083</a:t>
+                      </a:r>
+                    </a:p>
+                  </a:txBody>
+                  <a:tcPr marL="9525" marR="9525" marT="9525" marB="0" anchor="b"/>
+                </a:tc>
+                <a:tc>
+                  <a:txBody>
+                    <a:bodyPr/>
+                    <a:lstStyle/>
+                    <a:p>
+                      <a:pPr algn="r" fontAlgn="b"/>
+                      <a:r>
+                        <a:rPr lang="en-US" sz="1100" b="0" i="0" u="none" strike="noStrike">
+                          <a:solidFill>
+                            <a:srgbClr val="000000"/>
+                          </a:solidFill>
+                          <a:effectLst/>
+                          <a:latin typeface="Calibri" panose="020F0502020204030204" pitchFamily="34" charset="0"/>
+                        </a:rPr>
+                        <a:t>54.219</a:t>
+                      </a:r>
+                    </a:p>
+                  </a:txBody>
+                  <a:tcPr marL="9525" marR="9525" marT="9525" marB="0" anchor="b"/>
+                </a:tc>
+                <a:tc>
+                  <a:txBody>
+                    <a:bodyPr/>
+                    <a:lstStyle/>
+                    <a:p>
+                      <a:pPr algn="r" fontAlgn="b"/>
+                      <a:r>
+                        <a:rPr lang="en-US" sz="1100" b="0" i="0" u="none" strike="noStrike">
+                          <a:solidFill>
+                            <a:srgbClr val="000000"/>
+                          </a:solidFill>
+                          <a:effectLst/>
+                          <a:latin typeface="Calibri" panose="020F0502020204030204" pitchFamily="34" charset="0"/>
+                        </a:rPr>
+                        <a:t>92.591</a:t>
+                      </a:r>
+                    </a:p>
+                  </a:txBody>
+                  <a:tcPr marL="9525" marR="9525" marT="9525" marB="0" anchor="b"/>
+                </a:tc>
+                <a:extLst>
+                  <a:ext uri="{0D108BD9-81ED-4DB2-BD59-A6C34878D82A}">
+                    <a16:rowId xmlns:a16="http://schemas.microsoft.com/office/drawing/2014/main" val="1638871936"/>
+                  </a:ext>
+                </a:extLst>
+              </a:tr>
+              <a:tr h="175044">
+                <a:tc>
+                  <a:txBody>
+                    <a:bodyPr/>
+                    <a:lstStyle/>
+                    <a:p>
+                      <a:pPr algn="r" fontAlgn="b"/>
+                      <a:r>
+                        <a:rPr lang="en-US" sz="1100" b="0" i="0" u="none" strike="noStrike">
+                          <a:solidFill>
+                            <a:srgbClr val="000000"/>
+                          </a:solidFill>
+                          <a:effectLst/>
+                          <a:latin typeface="Calibri" panose="020F0502020204030204" pitchFamily="34" charset="0"/>
+                        </a:rPr>
+                        <a:t>4</a:t>
+                      </a:r>
+                    </a:p>
+                  </a:txBody>
+                  <a:tcPr marL="9525" marR="9525" marT="9525" marB="0" anchor="b"/>
+                </a:tc>
+                <a:tc>
+                  <a:txBody>
+                    <a:bodyPr/>
+                    <a:lstStyle/>
+                    <a:p>
+                      <a:pPr algn="r" fontAlgn="b"/>
+                      <a:r>
+                        <a:rPr lang="en-US" sz="1100" b="0" i="0" u="none" strike="noStrike">
+                          <a:solidFill>
+                            <a:srgbClr val="000000"/>
+                          </a:solidFill>
+                          <a:effectLst/>
+                          <a:latin typeface="Calibri" panose="020F0502020204030204" pitchFamily="34" charset="0"/>
+                        </a:rPr>
+                        <a:t>961</a:t>
+                      </a:r>
+                    </a:p>
+                  </a:txBody>
+                  <a:tcPr marL="9525" marR="9525" marT="9525" marB="0" anchor="b"/>
+                </a:tc>
+                <a:tc>
+                  <a:txBody>
+                    <a:bodyPr/>
+                    <a:lstStyle/>
+                    <a:p>
+                      <a:pPr algn="r" fontAlgn="b"/>
+                      <a:r>
+                        <a:rPr lang="en-US" sz="1100" b="0" i="0" u="none" strike="noStrike">
+                          <a:solidFill>
+                            <a:srgbClr val="000000"/>
+                          </a:solidFill>
+                          <a:effectLst/>
+                          <a:latin typeface="Calibri" panose="020F0502020204030204" pitchFamily="34" charset="0"/>
+                        </a:rPr>
+                        <a:t>180.125</a:t>
+                      </a:r>
+                    </a:p>
+                  </a:txBody>
+                  <a:tcPr marL="9525" marR="9525" marT="9525" marB="0" anchor="b"/>
+                </a:tc>
+                <a:tc>
+                  <a:txBody>
+                    <a:bodyPr/>
+                    <a:lstStyle/>
+                    <a:p>
+                      <a:pPr algn="r" fontAlgn="b"/>
+                      <a:r>
+                        <a:rPr lang="en-US" sz="1100" b="0" i="0" u="none" strike="noStrike">
+                          <a:solidFill>
+                            <a:srgbClr val="000000"/>
+                          </a:solidFill>
+                          <a:effectLst/>
+                          <a:latin typeface="Calibri" panose="020F0502020204030204" pitchFamily="34" charset="0"/>
+                        </a:rPr>
+                        <a:t>157.198</a:t>
+                      </a:r>
+                    </a:p>
+                  </a:txBody>
+                  <a:tcPr marL="9525" marR="9525" marT="9525" marB="0" anchor="b"/>
+                </a:tc>
+                <a:tc>
+                  <a:txBody>
+                    <a:bodyPr/>
+                    <a:lstStyle/>
+                    <a:p>
+                      <a:pPr algn="r" fontAlgn="b"/>
+                      <a:r>
+                        <a:rPr lang="en-US" sz="1100" b="0" i="0" u="none" strike="noStrike">
+                          <a:solidFill>
+                            <a:srgbClr val="000000"/>
+                          </a:solidFill>
+                          <a:effectLst/>
+                          <a:latin typeface="Calibri" panose="020F0502020204030204" pitchFamily="34" charset="0"/>
+                        </a:rPr>
+                        <a:t>113.365</a:t>
+                      </a:r>
+                    </a:p>
+                  </a:txBody>
+                  <a:tcPr marL="9525" marR="9525" marT="9525" marB="0" anchor="b"/>
+                </a:tc>
+                <a:extLst>
+                  <a:ext uri="{0D108BD9-81ED-4DB2-BD59-A6C34878D82A}">
+                    <a16:rowId xmlns:a16="http://schemas.microsoft.com/office/drawing/2014/main" val="963997415"/>
+                  </a:ext>
+                </a:extLst>
+              </a:tr>
+              <a:tr h="175044">
+                <a:tc>
+                  <a:txBody>
+                    <a:bodyPr/>
+                    <a:lstStyle/>
+                    <a:p>
+                      <a:pPr algn="r" fontAlgn="b"/>
+                      <a:r>
+                        <a:rPr lang="en-US" sz="1100" b="0" i="0" u="none" strike="noStrike">
+                          <a:solidFill>
+                            <a:srgbClr val="000000"/>
+                          </a:solidFill>
+                          <a:effectLst/>
+                          <a:latin typeface="Calibri" panose="020F0502020204030204" pitchFamily="34" charset="0"/>
+                        </a:rPr>
+                        <a:t>5</a:t>
+                      </a:r>
+                    </a:p>
+                  </a:txBody>
+                  <a:tcPr marL="9525" marR="9525" marT="9525" marB="0" anchor="b">
+                    <a:lnB>
+                      <a:noFill/>
+                    </a:lnB>
+                  </a:tcPr>
+                </a:tc>
+                <a:tc>
+                  <a:txBody>
+                    <a:bodyPr/>
+                    <a:lstStyle/>
+                    <a:p>
+                      <a:pPr algn="r" fontAlgn="b"/>
+                      <a:r>
+                        <a:rPr lang="en-US" sz="1100" b="0" i="0" u="none" strike="noStrike">
+                          <a:solidFill>
+                            <a:srgbClr val="000000"/>
+                          </a:solidFill>
+                          <a:effectLst/>
+                          <a:latin typeface="Calibri" panose="020F0502020204030204" pitchFamily="34" charset="0"/>
+                        </a:rPr>
+                        <a:t>402</a:t>
+                      </a:r>
+                    </a:p>
+                  </a:txBody>
+                  <a:tcPr marL="9525" marR="9525" marT="9525" marB="0" anchor="b">
+                    <a:lnB>
+                      <a:noFill/>
+                    </a:lnB>
+                  </a:tcPr>
+                </a:tc>
+                <a:tc>
+                  <a:txBody>
+                    <a:bodyPr/>
+                    <a:lstStyle/>
+                    <a:p>
+                      <a:pPr algn="r" fontAlgn="b"/>
+                      <a:r>
+                        <a:rPr lang="en-US" sz="1100" b="0" i="0" u="none" strike="noStrike">
+                          <a:solidFill>
+                            <a:srgbClr val="000000"/>
+                          </a:solidFill>
+                          <a:effectLst/>
+                          <a:latin typeface="Calibri" panose="020F0502020204030204" pitchFamily="34" charset="0"/>
+                        </a:rPr>
+                        <a:t>91.74</a:t>
+                      </a:r>
+                    </a:p>
+                  </a:txBody>
+                  <a:tcPr marL="9525" marR="9525" marT="9525" marB="0" anchor="b">
+                    <a:lnB>
+                      <a:noFill/>
+                    </a:lnB>
+                  </a:tcPr>
+                </a:tc>
+                <a:tc>
+                  <a:txBody>
+                    <a:bodyPr/>
+                    <a:lstStyle/>
+                    <a:p>
+                      <a:pPr algn="r" fontAlgn="b"/>
+                      <a:r>
+                        <a:rPr lang="en-US" sz="1100" b="0" i="0" u="none" strike="noStrike">
+                          <a:solidFill>
+                            <a:srgbClr val="000000"/>
+                          </a:solidFill>
+                          <a:effectLst/>
+                          <a:latin typeface="Calibri" panose="020F0502020204030204" pitchFamily="34" charset="0"/>
+                        </a:rPr>
+                        <a:t>95.754</a:t>
+                      </a:r>
+                    </a:p>
+                  </a:txBody>
+                  <a:tcPr marL="9525" marR="9525" marT="9525" marB="0" anchor="b">
+                    <a:lnB>
+                      <a:noFill/>
+                    </a:lnB>
+                  </a:tcPr>
+                </a:tc>
+                <a:tc>
+                  <a:txBody>
+                    <a:bodyPr/>
+                    <a:lstStyle/>
+                    <a:p>
+                      <a:pPr algn="r" fontAlgn="b"/>
+                      <a:r>
+                        <a:rPr lang="en-US" sz="1100" b="0" i="0" u="none" strike="noStrike">
+                          <a:solidFill>
+                            <a:srgbClr val="000000"/>
+                          </a:solidFill>
+                          <a:effectLst/>
+                          <a:latin typeface="Calibri" panose="020F0502020204030204" pitchFamily="34" charset="0"/>
+                        </a:rPr>
+                        <a:t>138.192</a:t>
+                      </a:r>
+                    </a:p>
+                  </a:txBody>
+                  <a:tcPr marL="9525" marR="9525" marT="9525" marB="0" anchor="b">
+                    <a:lnB>
+                      <a:noFill/>
+                    </a:lnB>
+                  </a:tcPr>
+                </a:tc>
+                <a:extLst>
+                  <a:ext uri="{0D108BD9-81ED-4DB2-BD59-A6C34878D82A}">
+                    <a16:rowId xmlns:a16="http://schemas.microsoft.com/office/drawing/2014/main" val="3326698686"/>
+                  </a:ext>
+                </a:extLst>
+              </a:tr>
+              <a:tr h="175044">
+                <a:tc>
+                  <a:txBody>
+                    <a:bodyPr/>
+                    <a:lstStyle/>
+                    <a:p>
+                      <a:pPr algn="r" fontAlgn="b"/>
+                      <a:r>
+                        <a:rPr lang="en-US" sz="1100" b="0" i="0" u="none" strike="noStrike">
+                          <a:solidFill>
+                            <a:srgbClr val="000000"/>
+                          </a:solidFill>
+                          <a:effectLst/>
+                          <a:latin typeface="Calibri" panose="020F0502020204030204" pitchFamily="34" charset="0"/>
+                        </a:rPr>
+                        <a:t>6</a:t>
+                      </a:r>
+                    </a:p>
+                  </a:txBody>
+                  <a:tcPr marL="9525" marR="9525" marT="9525" marB="0" anchor="b">
+                    <a:lnL>
+                      <a:noFill/>
+                    </a:lnL>
+                    <a:lnR>
+                      <a:noFill/>
+                    </a:lnR>
+                    <a:lnT>
+                      <a:noFill/>
+                    </a:lnT>
+                    <a:lnB w="12700" cmpd="sng">
+                      <a:noFill/>
+                    </a:lnB>
+                    <a:lnTlToBr w="12700" cmpd="sng">
+                      <a:noFill/>
+                      <a:prstDash val="solid"/>
+                    </a:lnTlToBr>
+                    <a:lnBlToTr w="12700" cmpd="sng">
+                      <a:noFill/>
+                      <a:prstDash val="solid"/>
+                    </a:lnBlToTr>
+                  </a:tcPr>
+                </a:tc>
+                <a:tc>
+                  <a:txBody>
+                    <a:bodyPr/>
+                    <a:lstStyle/>
+                    <a:p>
+                      <a:pPr algn="r" fontAlgn="b"/>
+                      <a:r>
+                        <a:rPr lang="en-US" sz="1100" b="0" i="0" u="none" strike="noStrike">
+                          <a:solidFill>
+                            <a:srgbClr val="000000"/>
+                          </a:solidFill>
+                          <a:effectLst/>
+                          <a:latin typeface="Calibri" panose="020F0502020204030204" pitchFamily="34" charset="0"/>
+                        </a:rPr>
+                        <a:t>778</a:t>
+                      </a:r>
+                    </a:p>
+                  </a:txBody>
+                  <a:tcPr marL="9525" marR="9525" marT="9525" marB="0" anchor="b">
+                    <a:lnL>
+                      <a:noFill/>
+                    </a:lnL>
+                    <a:lnR>
+                      <a:noFill/>
+                    </a:lnR>
+                    <a:lnT>
+                      <a:noFill/>
+                    </a:lnT>
+                    <a:lnB w="12700" cmpd="sng">
+                      <a:noFill/>
+                    </a:lnB>
+                    <a:lnTlToBr w="12700" cmpd="sng">
+                      <a:noFill/>
+                      <a:prstDash val="solid"/>
+                    </a:lnTlToBr>
+                    <a:lnBlToTr w="12700" cmpd="sng">
+                      <a:noFill/>
+                      <a:prstDash val="solid"/>
+                    </a:lnBlToTr>
+                  </a:tcPr>
+                </a:tc>
+                <a:tc>
+                  <a:txBody>
+                    <a:bodyPr/>
+                    <a:lstStyle/>
+                    <a:p>
+                      <a:pPr algn="r" fontAlgn="b"/>
+                      <a:r>
+                        <a:rPr lang="en-US" sz="1100" b="0" i="0" u="none" strike="noStrike">
+                          <a:solidFill>
+                            <a:srgbClr val="000000"/>
+                          </a:solidFill>
+                          <a:effectLst/>
+                          <a:latin typeface="Calibri" panose="020F0502020204030204" pitchFamily="34" charset="0"/>
+                        </a:rPr>
+                        <a:t>142.267</a:t>
+                      </a:r>
+                    </a:p>
+                  </a:txBody>
+                  <a:tcPr marL="9525" marR="9525" marT="9525" marB="0" anchor="b">
+                    <a:lnL>
+                      <a:noFill/>
+                    </a:lnL>
+                    <a:lnR>
+                      <a:noFill/>
+                    </a:lnR>
+                    <a:lnT>
+                      <a:noFill/>
+                    </a:lnT>
+                    <a:lnB w="12700" cmpd="sng">
+                      <a:noFill/>
+                    </a:lnB>
+                    <a:lnTlToBr w="12700" cmpd="sng">
+                      <a:noFill/>
+                      <a:prstDash val="solid"/>
+                    </a:lnTlToBr>
+                    <a:lnBlToTr w="12700" cmpd="sng">
+                      <a:noFill/>
+                      <a:prstDash val="solid"/>
+                    </a:lnBlToTr>
+                  </a:tcPr>
+                </a:tc>
+                <a:tc>
+                  <a:txBody>
+                    <a:bodyPr/>
+                    <a:lstStyle/>
+                    <a:p>
+                      <a:pPr algn="r" fontAlgn="b"/>
+                      <a:r>
+                        <a:rPr lang="en-US" sz="1100" b="0" i="0" u="none" strike="noStrike" dirty="0">
+                          <a:solidFill>
+                            <a:srgbClr val="000000"/>
+                          </a:solidFill>
+                          <a:effectLst/>
+                          <a:latin typeface="Calibri" panose="020F0502020204030204" pitchFamily="34" charset="0"/>
+                        </a:rPr>
+                        <a:t>41.621</a:t>
+                      </a:r>
+                    </a:p>
+                  </a:txBody>
+                  <a:tcPr marL="9525" marR="9525" marT="9525" marB="0" anchor="b">
+                    <a:lnL>
+                      <a:noFill/>
+                    </a:lnL>
+                    <a:lnR>
+                      <a:noFill/>
+                    </a:lnR>
+                    <a:lnT>
+                      <a:noFill/>
+                    </a:lnT>
+                    <a:lnB w="12700" cmpd="sng">
+                      <a:noFill/>
+                    </a:lnB>
+                    <a:lnTlToBr w="12700" cmpd="sng">
+                      <a:noFill/>
+                      <a:prstDash val="solid"/>
+                    </a:lnTlToBr>
+                    <a:lnBlToTr w="12700" cmpd="sng">
+                      <a:noFill/>
+                      <a:prstDash val="solid"/>
+                    </a:lnBlToTr>
+                  </a:tcPr>
+                </a:tc>
+                <a:tc>
+                  <a:txBody>
+                    <a:bodyPr/>
+                    <a:lstStyle/>
+                    <a:p>
+                      <a:pPr algn="r" fontAlgn="b"/>
+                      <a:r>
+                        <a:rPr lang="en-US" sz="1100" b="0" i="0" u="none" strike="noStrike" dirty="0">
+                          <a:solidFill>
+                            <a:srgbClr val="000000"/>
+                          </a:solidFill>
+                          <a:effectLst/>
+                          <a:latin typeface="Calibri" panose="020F0502020204030204" pitchFamily="34" charset="0"/>
+                        </a:rPr>
+                        <a:t>169.522</a:t>
+                      </a:r>
+                    </a:p>
+                  </a:txBody>
+                  <a:tcPr marL="9525" marR="9525" marT="9525" marB="0" anchor="b">
+                    <a:lnL>
+                      <a:noFill/>
+                    </a:lnL>
+                    <a:lnR>
+                      <a:noFill/>
+                    </a:lnR>
+                    <a:lnT>
+                      <a:noFill/>
+                    </a:lnT>
+                    <a:lnB w="12700" cmpd="sng">
+                      <a:noFill/>
+                    </a:lnB>
+                    <a:lnTlToBr w="12700" cmpd="sng">
+                      <a:noFill/>
+                      <a:prstDash val="solid"/>
+                    </a:lnTlToBr>
+                    <a:lnBlToTr w="12700" cmpd="sng">
+                      <a:noFill/>
+                      <a:prstDash val="solid"/>
+                    </a:lnBlToTr>
+                  </a:tcPr>
+                </a:tc>
+                <a:extLst>
+                  <a:ext uri="{0D108BD9-81ED-4DB2-BD59-A6C34878D82A}">
+                    <a16:rowId xmlns:a16="http://schemas.microsoft.com/office/drawing/2014/main" val="3930783488"/>
+                  </a:ext>
+                </a:extLst>
+              </a:tr>
+            </a:tbl>
+          </a:graphicData>
+        </a:graphic>
+      </p:graphicFrame>
+      <p:pic>
+        <p:nvPicPr>
+          <p:cNvPr id="3" name="Picture 2"/>
+          <p:cNvPicPr>
+            <a:picLocks noChangeAspect="1"/>
+          </p:cNvPicPr>
+          <p:nvPr/>
+        </p:nvPicPr>
+        <p:blipFill>
+          <a:blip r:embed="rId3"/>
+          <a:stretch>
+            <a:fillRect/>
+          </a:stretch>
+        </p:blipFill>
+        <p:spPr>
+          <a:xfrm rot="16200000">
+            <a:off x="6531143" y="1613032"/>
+            <a:ext cx="1464837" cy="1796437"/>
+          </a:xfrm>
+          <a:prstGeom prst="rect">
+            <a:avLst/>
+          </a:prstGeom>
+          <a:ln>
+            <a:solidFill>
+              <a:schemeClr val="tx1"/>
+            </a:solidFill>
+          </a:ln>
+        </p:spPr>
+      </p:pic>
+    </p:spTree>
+    <p:extLst>
+      <p:ext uri="{BB962C8B-B14F-4D97-AF65-F5344CB8AC3E}">
+        <p14:creationId xmlns:p14="http://schemas.microsoft.com/office/powerpoint/2010/main" val="651207251"/>
+      </p:ext>
+    </p:extLst>
+  </p:cSld>
+  <p:clrMapOvr>
+    <a:masterClrMapping/>
+  </p:clrMapOvr>
+</p:sld>
+</file>
+
 <file path=ppt/theme/theme1.xml><?xml version="1.0" encoding="utf-8"?>
 <a:theme xmlns:a="http://schemas.openxmlformats.org/drawingml/2006/main" name="Office Theme">
   <a:themeElements>

</xml_diff>